<commit_message>
feature: 更新 icon ppt
</commit_message>
<xml_diff>
--- a/download/icon.pptx
+++ b/download/icon.pptx
@@ -301,7 +301,7 @@
             <a:fld id="{530820CF-B880-4189-942D-D702A7CBA730}" type="datetimeFigureOut">
               <a:rPr lang="zh-CN" altLang="en-US" smtClean="0"/>
               <a:pPr/>
-              <a:t>2014/11/23</a:t>
+              <a:t>19/2/23</a:t>
             </a:fld>
             <a:endParaRPr lang="zh-CN" altLang="en-US"/>
           </a:p>
@@ -468,7 +468,7 @@
             <a:fld id="{530820CF-B880-4189-942D-D702A7CBA730}" type="datetimeFigureOut">
               <a:rPr lang="zh-CN" altLang="en-US" smtClean="0"/>
               <a:pPr/>
-              <a:t>2014/11/23</a:t>
+              <a:t>19/2/23</a:t>
             </a:fld>
             <a:endParaRPr lang="zh-CN" altLang="en-US"/>
           </a:p>
@@ -645,7 +645,7 @@
             <a:fld id="{530820CF-B880-4189-942D-D702A7CBA730}" type="datetimeFigureOut">
               <a:rPr lang="zh-CN" altLang="en-US" smtClean="0"/>
               <a:pPr/>
-              <a:t>2014/11/23</a:t>
+              <a:t>19/2/23</a:t>
             </a:fld>
             <a:endParaRPr lang="zh-CN" altLang="en-US"/>
           </a:p>
@@ -812,7 +812,7 @@
             <a:fld id="{530820CF-B880-4189-942D-D702A7CBA730}" type="datetimeFigureOut">
               <a:rPr lang="zh-CN" altLang="en-US" smtClean="0"/>
               <a:pPr/>
-              <a:t>2014/11/23</a:t>
+              <a:t>19/2/23</a:t>
             </a:fld>
             <a:endParaRPr lang="zh-CN" altLang="en-US"/>
           </a:p>
@@ -1055,7 +1055,7 @@
             <a:fld id="{530820CF-B880-4189-942D-D702A7CBA730}" type="datetimeFigureOut">
               <a:rPr lang="zh-CN" altLang="en-US" smtClean="0"/>
               <a:pPr/>
-              <a:t>2014/11/23</a:t>
+              <a:t>19/2/23</a:t>
             </a:fld>
             <a:endParaRPr lang="zh-CN" altLang="en-US"/>
           </a:p>
@@ -1340,7 +1340,7 @@
             <a:fld id="{530820CF-B880-4189-942D-D702A7CBA730}" type="datetimeFigureOut">
               <a:rPr lang="zh-CN" altLang="en-US" smtClean="0"/>
               <a:pPr/>
-              <a:t>2014/11/23</a:t>
+              <a:t>19/2/23</a:t>
             </a:fld>
             <a:endParaRPr lang="zh-CN" altLang="en-US"/>
           </a:p>
@@ -1759,7 +1759,7 @@
             <a:fld id="{530820CF-B880-4189-942D-D702A7CBA730}" type="datetimeFigureOut">
               <a:rPr lang="zh-CN" altLang="en-US" smtClean="0"/>
               <a:pPr/>
-              <a:t>2014/11/23</a:t>
+              <a:t>19/2/23</a:t>
             </a:fld>
             <a:endParaRPr lang="zh-CN" altLang="en-US"/>
           </a:p>
@@ -1874,7 +1874,7 @@
             <a:fld id="{530820CF-B880-4189-942D-D702A7CBA730}" type="datetimeFigureOut">
               <a:rPr lang="zh-CN" altLang="en-US" smtClean="0"/>
               <a:pPr/>
-              <a:t>2014/11/23</a:t>
+              <a:t>19/2/23</a:t>
             </a:fld>
             <a:endParaRPr lang="zh-CN" altLang="en-US"/>
           </a:p>
@@ -1966,7 +1966,7 @@
             <a:fld id="{530820CF-B880-4189-942D-D702A7CBA730}" type="datetimeFigureOut">
               <a:rPr lang="zh-CN" altLang="en-US" smtClean="0"/>
               <a:pPr/>
-              <a:t>2014/11/23</a:t>
+              <a:t>19/2/23</a:t>
             </a:fld>
             <a:endParaRPr lang="zh-CN" altLang="en-US"/>
           </a:p>
@@ -2240,7 +2240,7 @@
             <a:fld id="{530820CF-B880-4189-942D-D702A7CBA730}" type="datetimeFigureOut">
               <a:rPr lang="zh-CN" altLang="en-US" smtClean="0"/>
               <a:pPr/>
-              <a:t>2014/11/23</a:t>
+              <a:t>19/2/23</a:t>
             </a:fld>
             <a:endParaRPr lang="zh-CN" altLang="en-US"/>
           </a:p>
@@ -2490,7 +2490,7 @@
             <a:fld id="{530820CF-B880-4189-942D-D702A7CBA730}" type="datetimeFigureOut">
               <a:rPr lang="zh-CN" altLang="en-US" smtClean="0"/>
               <a:pPr/>
-              <a:t>2014/11/23</a:t>
+              <a:t>19/2/23</a:t>
             </a:fld>
             <a:endParaRPr lang="zh-CN" altLang="en-US"/>
           </a:p>
@@ -2700,7 +2700,7 @@
             <a:fld id="{530820CF-B880-4189-942D-D702A7CBA730}" type="datetimeFigureOut">
               <a:rPr lang="zh-CN" altLang="en-US" smtClean="0"/>
               <a:pPr/>
-              <a:t>2014/11/23</a:t>
+              <a:t>19/2/23</a:t>
             </a:fld>
             <a:endParaRPr lang="zh-CN" altLang="en-US"/>
           </a:p>
@@ -3275,6 +3275,13 @@
   <p:clrMapOvr>
     <a:masterClrMapping/>
   </p:clrMapOvr>
+  <p:timing>
+    <p:tnLst>
+      <p:par>
+        <p:cTn xmlns:p14="http://schemas.microsoft.com/office/powerpoint/2010/main" id="1" dur="indefinite" restart="never" nodeType="tmRoot"/>
+      </p:par>
+    </p:tnLst>
+  </p:timing>
 </p:sld>
 </file>
 
@@ -3439,11 +3446,48 @@
           </a:p>
         </p:txBody>
       </p:sp>
+      <p:pic>
+        <p:nvPicPr>
+          <p:cNvPr id="3" name="图片 2" descr="ningg_url.gif"/>
+          <p:cNvPicPr>
+            <a:picLocks noChangeAspect="1"/>
+          </p:cNvPicPr>
+          <p:nvPr/>
+        </p:nvPicPr>
+        <p:blipFill>
+          <a:blip r:embed="rId2">
+            <a:extLst>
+              <a:ext uri="{28A0092B-C50C-407E-A947-70E740481C1C}">
+                <a14:useLocalDpi xmlns:a14="http://schemas.microsoft.com/office/drawing/2010/main" val="0"/>
+              </a:ext>
+            </a:extLst>
+          </a:blip>
+          <a:stretch>
+            <a:fillRect/>
+          </a:stretch>
+        </p:blipFill>
+        <p:spPr>
+          <a:xfrm>
+            <a:off x="270347" y="486371"/>
+            <a:ext cx="3600400" cy="3600400"/>
+          </a:xfrm>
+          <a:prstGeom prst="rect">
+            <a:avLst/>
+          </a:prstGeom>
+        </p:spPr>
+      </p:pic>
     </p:spTree>
   </p:cSld>
   <p:clrMapOvr>
     <a:masterClrMapping/>
   </p:clrMapOvr>
+  <p:timing>
+    <p:tnLst>
+      <p:par>
+        <p:cTn xmlns:p14="http://schemas.microsoft.com/office/powerpoint/2010/main" id="1" dur="indefinite" restart="never" nodeType="tmRoot"/>
+      </p:par>
+    </p:tnLst>
+  </p:timing>
 </p:sld>
 </file>
 
@@ -3600,6 +3644,13 @@
   <p:clrMapOvr>
     <a:masterClrMapping/>
   </p:clrMapOvr>
+  <p:timing>
+    <p:tnLst>
+      <p:par>
+        <p:cTn xmlns:p14="http://schemas.microsoft.com/office/powerpoint/2010/main" id="1" dur="indefinite" restart="never" nodeType="tmRoot"/>
+      </p:par>
+    </p:tnLst>
+  </p:timing>
 </p:sld>
 </file>
 
@@ -3756,6 +3807,13 @@
   <p:clrMapOvr>
     <a:masterClrMapping/>
   </p:clrMapOvr>
+  <p:timing>
+    <p:tnLst>
+      <p:par>
+        <p:cTn xmlns:p14="http://schemas.microsoft.com/office/powerpoint/2010/main" id="1" dur="indefinite" restart="never" nodeType="tmRoot"/>
+      </p:par>
+    </p:tnLst>
+  </p:timing>
 </p:sld>
 </file>
 

</xml_diff>